<commit_message>
Bab 3 + Matlab (29-7)
</commit_message>
<xml_diff>
--- a/Ms. Office/Source Code.pptx
+++ b/Ms. Office/Source Code.pptx
@@ -267,7 +267,7 @@
           <a:p>
             <a:fld id="{49E510D1-0684-4428-8310-E7B93720E140}" type="datetimeFigureOut">
               <a:rPr lang="en-GB" smtClean="0"/>
-              <a:t>26/07/2018</a:t>
+              <a:t>29/07/2018</a:t>
             </a:fld>
             <a:endParaRPr lang="en-GB"/>
           </a:p>
@@ -467,7 +467,7 @@
           <a:p>
             <a:fld id="{49E510D1-0684-4428-8310-E7B93720E140}" type="datetimeFigureOut">
               <a:rPr lang="en-GB" smtClean="0"/>
-              <a:t>26/07/2018</a:t>
+              <a:t>29/07/2018</a:t>
             </a:fld>
             <a:endParaRPr lang="en-GB"/>
           </a:p>
@@ -677,7 +677,7 @@
           <a:p>
             <a:fld id="{49E510D1-0684-4428-8310-E7B93720E140}" type="datetimeFigureOut">
               <a:rPr lang="en-GB" smtClean="0"/>
-              <a:t>26/07/2018</a:t>
+              <a:t>29/07/2018</a:t>
             </a:fld>
             <a:endParaRPr lang="en-GB"/>
           </a:p>
@@ -877,7 +877,7 @@
           <a:p>
             <a:fld id="{49E510D1-0684-4428-8310-E7B93720E140}" type="datetimeFigureOut">
               <a:rPr lang="en-GB" smtClean="0"/>
-              <a:t>26/07/2018</a:t>
+              <a:t>29/07/2018</a:t>
             </a:fld>
             <a:endParaRPr lang="en-GB"/>
           </a:p>
@@ -1153,7 +1153,7 @@
           <a:p>
             <a:fld id="{49E510D1-0684-4428-8310-E7B93720E140}" type="datetimeFigureOut">
               <a:rPr lang="en-GB" smtClean="0"/>
-              <a:t>26/07/2018</a:t>
+              <a:t>29/07/2018</a:t>
             </a:fld>
             <a:endParaRPr lang="en-GB"/>
           </a:p>
@@ -1421,7 +1421,7 @@
           <a:p>
             <a:fld id="{49E510D1-0684-4428-8310-E7B93720E140}" type="datetimeFigureOut">
               <a:rPr lang="en-GB" smtClean="0"/>
-              <a:t>26/07/2018</a:t>
+              <a:t>29/07/2018</a:t>
             </a:fld>
             <a:endParaRPr lang="en-GB"/>
           </a:p>
@@ -1836,7 +1836,7 @@
           <a:p>
             <a:fld id="{49E510D1-0684-4428-8310-E7B93720E140}" type="datetimeFigureOut">
               <a:rPr lang="en-GB" smtClean="0"/>
-              <a:t>26/07/2018</a:t>
+              <a:t>29/07/2018</a:t>
             </a:fld>
             <a:endParaRPr lang="en-GB"/>
           </a:p>
@@ -1978,7 +1978,7 @@
           <a:p>
             <a:fld id="{49E510D1-0684-4428-8310-E7B93720E140}" type="datetimeFigureOut">
               <a:rPr lang="en-GB" smtClean="0"/>
-              <a:t>26/07/2018</a:t>
+              <a:t>29/07/2018</a:t>
             </a:fld>
             <a:endParaRPr lang="en-GB"/>
           </a:p>
@@ -2091,7 +2091,7 @@
           <a:p>
             <a:fld id="{49E510D1-0684-4428-8310-E7B93720E140}" type="datetimeFigureOut">
               <a:rPr lang="en-GB" smtClean="0"/>
-              <a:t>26/07/2018</a:t>
+              <a:t>29/07/2018</a:t>
             </a:fld>
             <a:endParaRPr lang="en-GB"/>
           </a:p>
@@ -2404,7 +2404,7 @@
           <a:p>
             <a:fld id="{49E510D1-0684-4428-8310-E7B93720E140}" type="datetimeFigureOut">
               <a:rPr lang="en-GB" smtClean="0"/>
-              <a:t>26/07/2018</a:t>
+              <a:t>29/07/2018</a:t>
             </a:fld>
             <a:endParaRPr lang="en-GB"/>
           </a:p>
@@ -2693,7 +2693,7 @@
           <a:p>
             <a:fld id="{49E510D1-0684-4428-8310-E7B93720E140}" type="datetimeFigureOut">
               <a:rPr lang="en-GB" smtClean="0"/>
-              <a:t>26/07/2018</a:t>
+              <a:t>29/07/2018</a:t>
             </a:fld>
             <a:endParaRPr lang="en-GB"/>
           </a:p>
@@ -2936,7 +2936,7 @@
           <a:p>
             <a:fld id="{49E510D1-0684-4428-8310-E7B93720E140}" type="datetimeFigureOut">
               <a:rPr lang="en-GB" smtClean="0"/>
-              <a:t>26/07/2018</a:t>
+              <a:t>29/07/2018</a:t>
             </a:fld>
             <a:endParaRPr lang="en-GB"/>
           </a:p>
@@ -3473,10 +3473,10 @@
       </p:grpSpPr>
       <p:pic>
         <p:nvPicPr>
-          <p:cNvPr id="4" name="Picture 3">
-            <a:extLst>
-              <a:ext uri="{FF2B5EF4-FFF2-40B4-BE49-F238E27FC236}">
-                <a16:creationId xmlns:a16="http://schemas.microsoft.com/office/drawing/2014/main" id="{7E169AD5-C024-483E-9A5D-7A77487E7CA7}"/>
+          <p:cNvPr id="2" name="Picture 1">
+            <a:extLst>
+              <a:ext uri="{FF2B5EF4-FFF2-40B4-BE49-F238E27FC236}">
+                <a16:creationId xmlns:a16="http://schemas.microsoft.com/office/drawing/2014/main" id="{C2353C02-CC98-437E-B5E2-BFB6D3C2397B}"/>
               </a:ext>
             </a:extLst>
           </p:cNvPr>
@@ -3487,13 +3487,13 @@
         </p:nvPicPr>
         <p:blipFill rotWithShape="1">
           <a:blip r:embed="rId2"/>
-          <a:srcRect l="19659" t="21602" b="38176"/>
+          <a:srcRect l="19546" t="21602" b="36762"/>
           <a:stretch/>
         </p:blipFill>
         <p:spPr>
           <a:xfrm>
-            <a:off x="1198418" y="2050472"/>
-            <a:ext cx="9795164" cy="2757055"/>
+            <a:off x="1191491" y="2001981"/>
+            <a:ext cx="9809018" cy="2854037"/>
           </a:xfrm>
           <a:prstGeom prst="rect">
             <a:avLst/>

</xml_diff>